<commit_message>
Minor change to pptx.
</commit_message>
<xml_diff>
--- a/InputFile.pptx
+++ b/InputFile.pptx
@@ -64,7 +64,7 @@
         <p:txBody>
           <a:bodyPr/>
           <a:p>
-            <a:fld id="{34730427-C2A1-4239-9881-03EE4E8CD9E4}" type="slidenum">
+            <a:fld id="{9AB459C6-61D8-4D79-BB99-9668ADCBDE5D}" type="slidenum">
               <a:t>&lt;#&gt;</a:t>
             </a:fld>
           </a:p>
@@ -273,7 +273,7 @@
         <p:txBody>
           <a:bodyPr/>
           <a:p>
-            <a:fld id="{BC6C30CC-843D-43F2-A1B7-DFACC5B3BC4A}" type="slidenum">
+            <a:fld id="{FE518578-7DF8-4DE7-8968-0F2A0BCA828D}" type="slidenum">
               <a:t>&lt;#&gt;</a:t>
             </a:fld>
           </a:p>
@@ -568,7 +568,7 @@
         <p:txBody>
           <a:bodyPr/>
           <a:p>
-            <a:fld id="{69118B58-23FE-4258-A246-B6CE7A7BCD5B}" type="slidenum">
+            <a:fld id="{05726CB6-6299-4C4D-8BB6-1AEDCA047CCD}" type="slidenum">
               <a:t>&lt;#&gt;</a:t>
             </a:fld>
           </a:p>
@@ -949,7 +949,7 @@
         <p:txBody>
           <a:bodyPr/>
           <a:p>
-            <a:fld id="{341F43C4-1C93-4CDE-B404-61B6565B19FF}" type="slidenum">
+            <a:fld id="{FE8B9EAF-A68C-4119-8533-6030BB7FE0C7}" type="slidenum">
               <a:t>&lt;#&gt;</a:t>
             </a:fld>
           </a:p>
@@ -1112,7 +1112,7 @@
         <p:txBody>
           <a:bodyPr/>
           <a:p>
-            <a:fld id="{B16C0A80-2AD8-4896-B36B-BC111D589E07}" type="slidenum">
+            <a:fld id="{A83B88FA-6BD8-4EA3-8941-F521D68DA788}" type="slidenum">
               <a:t>&lt;#&gt;</a:t>
             </a:fld>
           </a:p>
@@ -1278,7 +1278,7 @@
         <p:txBody>
           <a:bodyPr/>
           <a:p>
-            <a:fld id="{A4D8AE5B-E88A-41AE-8849-10D57EA754C6}" type="slidenum">
+            <a:fld id="{E3F1162B-860C-4DD6-96E8-0A29816527AE}" type="slidenum">
               <a:t>&lt;#&gt;</a:t>
             </a:fld>
           </a:p>
@@ -1487,7 +1487,7 @@
         <p:txBody>
           <a:bodyPr/>
           <a:p>
-            <a:fld id="{BF7BC17A-DA1B-4E9B-933D-12EF607B99DC}" type="slidenum">
+            <a:fld id="{B068FD22-0E36-46CF-88A4-4BF5B5A66972}" type="slidenum">
               <a:t>&lt;#&gt;</a:t>
             </a:fld>
           </a:p>
@@ -1610,7 +1610,7 @@
         <p:txBody>
           <a:bodyPr/>
           <a:p>
-            <a:fld id="{0EEA1DC4-607E-42EC-BEF5-7FB33729D4C7}" type="slidenum">
+            <a:fld id="{1B3B4793-8109-4F83-99EE-16C05C354B71}" type="slidenum">
               <a:t>&lt;#&gt;</a:t>
             </a:fld>
           </a:p>
@@ -1731,7 +1731,7 @@
         <p:txBody>
           <a:bodyPr/>
           <a:p>
-            <a:fld id="{9A75A1F3-53BC-4B1A-8488-08782CF1F331}" type="slidenum">
+            <a:fld id="{C552212B-0FA8-4286-AFBC-1BF0A54B2B24}" type="slidenum">
               <a:t>&lt;#&gt;</a:t>
             </a:fld>
           </a:p>
@@ -1983,7 +1983,7 @@
         <p:txBody>
           <a:bodyPr/>
           <a:p>
-            <a:fld id="{E2D7C5AC-CDC1-42B3-A48B-6AAEC8C50144}" type="slidenum">
+            <a:fld id="{29ED5F92-49EE-4B91-9162-324F925E1CC2}" type="slidenum">
               <a:t>&lt;#&gt;</a:t>
             </a:fld>
           </a:p>
@@ -2235,7 +2235,7 @@
         <p:txBody>
           <a:bodyPr/>
           <a:p>
-            <a:fld id="{EA4FA505-E212-49A6-A873-0E4591127CA0}" type="slidenum">
+            <a:fld id="{42F35D7D-81E5-4FDF-888C-954DDA77680E}" type="slidenum">
               <a:t>&lt;#&gt;</a:t>
             </a:fld>
           </a:p>
@@ -2487,7 +2487,7 @@
         <p:txBody>
           <a:bodyPr/>
           <a:p>
-            <a:fld id="{38D9E541-5BBA-4213-AE36-DC76F328A977}" type="slidenum">
+            <a:fld id="{B7C01E8D-BF28-472F-B5B3-868880B83F64}" type="slidenum">
               <a:t>&lt;#&gt;</a:t>
             </a:fld>
           </a:p>
@@ -3394,7 +3394,7 @@
                 <a:tab algn="l" pos="0"/>
               </a:tabLst>
             </a:pPr>
-            <a:fld id="{94A5AF7B-573D-4B19-A2EC-E26E8E7F7D0A}" type="slidenum">
+            <a:fld id="{88AD3361-01A7-4DD7-A86D-9261390F85C2}" type="slidenum">
               <a:rPr b="0" lang="en-GB" sz="1400" spc="-1" strike="noStrike">
                 <a:solidFill>
                   <a:srgbClr val="ffffff"/>

</xml_diff>